<commit_message>
added slide example and image for writing an algorithm
</commit_message>
<xml_diff>
--- a/Documents/writeup/paper/images/imageslide.pptx
+++ b/Documents/writeup/paper/images/imageslide.pptx
@@ -3366,11 +3366,13 @@
             </p:nvSpPr>
             <p:spPr/>
             <p:txBody>
-              <a:bodyPr/>
+              <a:bodyPr>
+                <a:normAutofit/>
+              </a:bodyPr>
               <a:lstStyle/>
               <a:p>
                 <a:r>
-                  <a:rPr lang="en-US" b="1" i="0" dirty="0">
+                  <a:rPr lang="en-US" sz="2000" b="1" i="0" dirty="0">
                     <a:latin typeface="+mj-lt"/>
                   </a:rPr>
                   <a:t>Input</a:t>
@@ -3378,7 +3380,7 @@
                 <a14:m>
                   <m:oMath xmlns:m="http://schemas.openxmlformats.org/officeDocument/2006/math">
                     <m:r>
-                      <a:rPr lang="en-US" b="1" i="1" dirty="0" smtClean="0">
+                      <a:rPr lang="en-US" sz="2000" b="1" i="1" dirty="0" smtClean="0">
                         <a:latin typeface="Cambria Math" panose="02040503050406030204" pitchFamily="18" charset="0"/>
                       </a:rPr>
                       <m:t>:</m:t>
@@ -3386,14 +3388,14 @@
                     <m:sSub>
                       <m:sSubPr>
                         <m:ctrlPr>
-                          <a:rPr lang="en-US" b="0" i="1" dirty="0" smtClean="0">
+                          <a:rPr lang="en-US" sz="2000" b="0" i="1" dirty="0" smtClean="0">
                             <a:latin typeface="Cambria Math" panose="02040503050406030204" pitchFamily="18" charset="0"/>
                           </a:rPr>
                         </m:ctrlPr>
                       </m:sSubPr>
                       <m:e>
                         <m:r>
-                          <a:rPr lang="en-US" b="0" i="1" dirty="0" smtClean="0">
+                          <a:rPr lang="en-US" sz="2000" b="0" i="1" dirty="0" smtClean="0">
                             <a:latin typeface="Cambria Math" panose="02040503050406030204" pitchFamily="18" charset="0"/>
                           </a:rPr>
                           <m:t>𝐾</m:t>
@@ -3401,19 +3403,19 @@
                       </m:e>
                       <m:sub>
                         <m:r>
-                          <a:rPr lang="en-US" i="1" dirty="0">
+                          <a:rPr lang="en-US" sz="2000" i="1" dirty="0">
                             <a:latin typeface="Cambria Math" panose="02040503050406030204" pitchFamily="18" charset="0"/>
                           </a:rPr>
                           <m:t>𝑚</m:t>
                         </m:r>
                         <m:r>
-                          <a:rPr lang="en-US" i="1" dirty="0">
+                          <a:rPr lang="en-US" sz="2000" i="1" dirty="0">
                             <a:latin typeface="Cambria Math" panose="02040503050406030204" pitchFamily="18" charset="0"/>
                           </a:rPr>
                           <m:t> × </m:t>
                         </m:r>
                         <m:r>
-                          <a:rPr lang="en-US" i="1" dirty="0">
+                          <a:rPr lang="en-US" sz="2000" i="1" dirty="0">
                             <a:latin typeface="Cambria Math" panose="02040503050406030204" pitchFamily="18" charset="0"/>
                           </a:rPr>
                           <m:t>𝑛</m:t>
@@ -3422,15 +3424,15 @@
                     </m:sSub>
                   </m:oMath>
                 </a14:m>
-                <a:endParaRPr lang="en-US" b="0" dirty="0"/>
+                <a:endParaRPr lang="en-US" sz="2000" b="0" dirty="0"/>
               </a:p>
               <a:p>
                 <a:r>
-                  <a:rPr lang="en-US" b="1" dirty="0"/>
+                  <a:rPr lang="en-US" sz="2000" b="1" dirty="0"/>
                   <a:t>Output:</a:t>
                 </a:r>
                 <a:r>
-                  <a:rPr lang="en-US" dirty="0"/>
+                  <a:rPr lang="en-US" sz="2000" dirty="0"/>
                   <a:t> user 1: </a:t>
                 </a:r>
                 <a14:m>
@@ -3439,14 +3441,14 @@
                       <m:accPr>
                         <m:chr m:val="⃗"/>
                         <m:ctrlPr>
-                          <a:rPr lang="en-US" b="0" i="1" smtClean="0">
+                          <a:rPr lang="en-US" sz="2000" b="0" i="1" smtClean="0">
                             <a:latin typeface="Cambria Math" panose="02040503050406030204" pitchFamily="18" charset="0"/>
                           </a:rPr>
                         </m:ctrlPr>
                       </m:accPr>
                       <m:e>
                         <m:r>
-                          <a:rPr lang="en-US" i="1">
+                          <a:rPr lang="en-US" sz="2000" i="1">
                             <a:latin typeface="Cambria Math" panose="02040503050406030204" pitchFamily="18" charset="0"/>
                           </a:rPr>
                           <m:t>𝐾</m:t>
@@ -3454,7 +3456,7 @@
                       </m:e>
                     </m:acc>
                     <m:r>
-                      <a:rPr lang="en-US" b="0" i="1" smtClean="0">
+                      <a:rPr lang="en-US" sz="2000" b="0" i="1" smtClean="0">
                         <a:latin typeface="Cambria Math" panose="02040503050406030204" pitchFamily="18" charset="0"/>
                       </a:rPr>
                       <m:t> ×  </m:t>
@@ -3463,14 +3465,14 @@
                       <m:accPr>
                         <m:chr m:val="⃗"/>
                         <m:ctrlPr>
-                          <a:rPr lang="en-US" b="0" i="1" smtClean="0">
+                          <a:rPr lang="en-US" sz="2000" b="0" i="1" smtClean="0">
                             <a:latin typeface="Cambria Math" panose="02040503050406030204" pitchFamily="18" charset="0"/>
                           </a:rPr>
                         </m:ctrlPr>
                       </m:accPr>
                       <m:e>
                         <m:r>
-                          <a:rPr lang="en-US" i="1">
+                          <a:rPr lang="en-US" sz="2000" i="1">
                             <a:latin typeface="Cambria Math" panose="02040503050406030204" pitchFamily="18" charset="0"/>
                           </a:rPr>
                           <m:t>𝑥</m:t>
@@ -3478,7 +3480,7 @@
                       </m:e>
                     </m:acc>
                     <m:r>
-                      <a:rPr lang="en-US" b="0" i="1" smtClean="0">
+                      <a:rPr lang="en-US" sz="2000" b="0" i="1" smtClean="0">
                         <a:latin typeface="Cambria Math" panose="02040503050406030204" pitchFamily="18" charset="0"/>
                       </a:rPr>
                       <m:t>+</m:t>
@@ -3487,14 +3489,14 @@
                       <m:accPr>
                         <m:chr m:val="⃗"/>
                         <m:ctrlPr>
-                          <a:rPr lang="en-US" i="1">
+                          <a:rPr lang="en-US" sz="2000" i="1">
                             <a:latin typeface="Cambria Math" panose="02040503050406030204" pitchFamily="18" charset="0"/>
                           </a:rPr>
                         </m:ctrlPr>
                       </m:accPr>
                       <m:e>
                         <m:r>
-                          <a:rPr lang="en-US" b="0" i="1" smtClean="0">
+                          <a:rPr lang="en-US" sz="2000" b="0" i="1" smtClean="0">
                             <a:latin typeface="Cambria Math" panose="02040503050406030204" pitchFamily="18" charset="0"/>
                           </a:rPr>
                           <m:t>𝑟</m:t>
@@ -3503,7 +3505,7 @@
                     </m:acc>
                   </m:oMath>
                 </a14:m>
-                <a:endParaRPr lang="en-US" dirty="0"/>
+                <a:endParaRPr lang="en-US" sz="2000" dirty="0"/>
               </a:p>
             </p:txBody>
           </p:sp>
@@ -3529,7 +3531,7 @@
               <a:blipFill>
                 <a:blip r:embed="rId2"/>
                 <a:stretch>
-                  <a:fillRect l="-1086" t="-2326"/>
+                  <a:fillRect l="-603" t="-1453"/>
                 </a:stretch>
               </a:blipFill>
             </p:spPr>

</xml_diff>

<commit_message>
paper updated, PRF protocols removed, implementation part changed
</commit_message>
<xml_diff>
--- a/Documents/writeup/paper/images/imageslide.pptx
+++ b/Documents/writeup/paper/images/imageslide.pptx
@@ -9,6 +9,7 @@
     <p:sldId id="1069" r:id="rId3"/>
     <p:sldId id="1070" r:id="rId4"/>
     <p:sldId id="1071" r:id="rId5"/>
+    <p:sldId id="1072" r:id="rId6"/>
   </p:sldIdLst>
   <p:sldSz cx="12192000" cy="6858000"/>
   <p:notesSz cx="6858000" cy="9144000"/>
@@ -3347,11 +3348,13 @@
         </p:nvSpPr>
         <p:spPr/>
         <p:txBody>
-          <a:bodyPr/>
+          <a:bodyPr>
+            <a:normAutofit/>
+          </a:bodyPr>
           <a:lstStyle/>
           <a:p>
             <a:r>
-              <a:rPr lang="en-US" dirty="0"/>
+              <a:rPr lang="en-US" sz="4000" dirty="0"/>
               <a:t>wPRF(TCC’18)</a:t>
             </a:r>
           </a:p>
@@ -3383,34 +3386,34 @@
               <a:lstStyle/>
               <a:p>
                 <a:r>
-                  <a:rPr lang="en-US" sz="2000" b="1" i="0" dirty="0"/>
+                  <a:rPr lang="en-US" sz="2400" b="1" i="0" dirty="0"/>
                   <a:t>Input: </a:t>
                 </a:r>
               </a:p>
               <a:p>
                 <a:pPr lvl="1"/>
                 <a:r>
-                  <a:rPr lang="en-US" sz="1600" i="0" dirty="0"/>
+                  <a:rPr lang="en-US" sz="1800" i="0" dirty="0"/>
                   <a:t>Private shares of </a:t>
                 </a:r>
                 <a:r>
-                  <a:rPr lang="en-US" sz="1600" dirty="0"/>
+                  <a:rPr lang="en-US" sz="1800" dirty="0"/>
                   <a:t>Key matrix</a:t>
                 </a:r>
                 <a:r>
-                  <a:rPr lang="en-US" sz="1600" b="1" dirty="0"/>
+                  <a:rPr lang="en-US" sz="1800" b="1" dirty="0"/>
                   <a:t> </a:t>
                 </a:r>
                 <a14:m>
                   <m:oMath xmlns:m="http://schemas.openxmlformats.org/officeDocument/2006/math">
                     <m:r>
-                      <a:rPr lang="en-US" sz="1600" b="1" i="1" smtClean="0">
+                      <a:rPr lang="en-US" sz="1800" b="1" i="1" smtClean="0">
                         <a:latin typeface="Cambria Math" panose="02040503050406030204" pitchFamily="18" charset="0"/>
                       </a:rPr>
                       <m:t>𝑲</m:t>
                     </m:r>
                     <m:r>
-                      <a:rPr lang="en-US" sz="1600" b="1" i="1" smtClean="0">
+                      <a:rPr lang="en-US" sz="1800" b="1" i="1" smtClean="0">
                         <a:latin typeface="Cambria Math" panose="02040503050406030204" pitchFamily="18" charset="0"/>
                         <a:ea typeface="Cambria Math" panose="02040503050406030204" pitchFamily="18" charset="0"/>
                       </a:rPr>
@@ -3419,7 +3422,7 @@
                     <m:sSubSup>
                       <m:sSubSupPr>
                         <m:ctrlPr>
-                          <a:rPr lang="en-US" sz="1600" b="1" i="1" smtClean="0">
+                          <a:rPr lang="en-US" sz="1800" b="1" i="1" smtClean="0">
                             <a:latin typeface="Cambria Math" panose="02040503050406030204" pitchFamily="18" charset="0"/>
                             <a:ea typeface="Cambria Math" panose="02040503050406030204" pitchFamily="18" charset="0"/>
                           </a:rPr>
@@ -3427,7 +3430,7 @@
                       </m:sSubSupPr>
                       <m:e>
                         <m:r>
-                          <a:rPr lang="en-US" sz="1600" b="1" i="1" smtClean="0">
+                          <a:rPr lang="en-US" sz="1800" b="1" i="1" smtClean="0">
                             <a:latin typeface="Cambria Math" panose="02040503050406030204" pitchFamily="18" charset="0"/>
                             <a:ea typeface="Cambria Math" panose="02040503050406030204" pitchFamily="18" charset="0"/>
                           </a:rPr>
@@ -3436,7 +3439,7 @@
                       </m:e>
                       <m:sub>
                         <m:r>
-                          <a:rPr lang="en-US" sz="1600" b="1" i="1" smtClean="0">
+                          <a:rPr lang="en-US" sz="1800" b="1" i="1" smtClean="0">
                             <a:latin typeface="Cambria Math" panose="02040503050406030204" pitchFamily="18" charset="0"/>
                             <a:ea typeface="Cambria Math" panose="02040503050406030204" pitchFamily="18" charset="0"/>
                           </a:rPr>
@@ -3445,21 +3448,21 @@
                       </m:sub>
                       <m:sup>
                         <m:r>
-                          <a:rPr lang="en-US" sz="1600" b="1" i="1" smtClean="0">
+                          <a:rPr lang="en-US" sz="1800" b="1" i="1" smtClean="0">
                             <a:latin typeface="Cambria Math" panose="02040503050406030204" pitchFamily="18" charset="0"/>
                             <a:ea typeface="Cambria Math" panose="02040503050406030204" pitchFamily="18" charset="0"/>
                           </a:rPr>
                           <m:t>𝒎</m:t>
                         </m:r>
                         <m:r>
-                          <a:rPr lang="en-US" sz="1600" b="1" i="1" smtClean="0">
+                          <a:rPr lang="en-US" sz="1800" b="1" i="1" smtClean="0">
                             <a:latin typeface="Cambria Math" panose="02040503050406030204" pitchFamily="18" charset="0"/>
                             <a:ea typeface="Cambria Math" panose="02040503050406030204" pitchFamily="18" charset="0"/>
                           </a:rPr>
                           <m:t> × </m:t>
                         </m:r>
                         <m:r>
-                          <a:rPr lang="en-US" sz="1600" b="1" i="1" smtClean="0">
+                          <a:rPr lang="en-US" sz="1800" b="1" i="1" smtClean="0">
                             <a:latin typeface="Cambria Math" panose="02040503050406030204" pitchFamily="18" charset="0"/>
                             <a:ea typeface="Cambria Math" panose="02040503050406030204" pitchFamily="18" charset="0"/>
                           </a:rPr>
@@ -3470,23 +3473,23 @@
                   </m:oMath>
                 </a14:m>
                 <a:r>
-                  <a:rPr lang="en-US" sz="1600" b="1" dirty="0"/>
+                  <a:rPr lang="en-US" sz="1800" b="1" dirty="0"/>
                   <a:t> </a:t>
                 </a:r>
                 <a:r>
-                  <a:rPr lang="en-US" sz="1600" dirty="0"/>
+                  <a:rPr lang="en-US" sz="1800" dirty="0"/>
                   <a:t>and input vector </a:t>
                 </a:r>
                 <a14:m>
                   <m:oMath xmlns:m="http://schemas.openxmlformats.org/officeDocument/2006/math">
                     <m:r>
-                      <a:rPr lang="en-US" sz="1600" b="1" i="1" smtClean="0">
+                      <a:rPr lang="en-US" sz="1800" b="1" i="1" smtClean="0">
                         <a:latin typeface="Cambria Math" panose="02040503050406030204" pitchFamily="18" charset="0"/>
                       </a:rPr>
                       <m:t>𝒙</m:t>
                     </m:r>
                     <m:r>
-                      <a:rPr lang="en-US" sz="1600" b="1" i="1" smtClean="0">
+                      <a:rPr lang="en-US" sz="1800" b="1" i="1" smtClean="0">
                         <a:latin typeface="Cambria Math" panose="02040503050406030204" pitchFamily="18" charset="0"/>
                       </a:rPr>
                       <m:t> ∈ </m:t>
@@ -3494,7 +3497,7 @@
                     <m:sSubSup>
                       <m:sSubSupPr>
                         <m:ctrlPr>
-                          <a:rPr lang="en-US" sz="1600" b="1" i="1" smtClean="0">
+                          <a:rPr lang="en-US" sz="1800" b="1" i="1" smtClean="0">
                             <a:latin typeface="Cambria Math" panose="02040503050406030204" pitchFamily="18" charset="0"/>
                             <a:ea typeface="Cambria Math" panose="02040503050406030204" pitchFamily="18" charset="0"/>
                           </a:rPr>
@@ -3502,7 +3505,7 @@
                       </m:sSubSupPr>
                       <m:e>
                         <m:r>
-                          <a:rPr lang="en-US" sz="1600" b="1" i="1" smtClean="0">
+                          <a:rPr lang="en-US" sz="1800" b="1" i="1" smtClean="0">
                             <a:latin typeface="Cambria Math" panose="02040503050406030204" pitchFamily="18" charset="0"/>
                             <a:ea typeface="Cambria Math" panose="02040503050406030204" pitchFamily="18" charset="0"/>
                           </a:rPr>
@@ -3511,7 +3514,7 @@
                       </m:e>
                       <m:sub>
                         <m:r>
-                          <a:rPr lang="en-US" sz="1600" b="1" i="1" smtClean="0">
+                          <a:rPr lang="en-US" sz="1800" b="1" i="1" smtClean="0">
                             <a:latin typeface="Cambria Math" panose="02040503050406030204" pitchFamily="18" charset="0"/>
                             <a:ea typeface="Cambria Math" panose="02040503050406030204" pitchFamily="18" charset="0"/>
                           </a:rPr>
@@ -3520,7 +3523,7 @@
                       </m:sub>
                       <m:sup>
                         <m:r>
-                          <a:rPr lang="en-US" sz="1600" b="1" i="1" smtClean="0">
+                          <a:rPr lang="en-US" sz="1800" b="1" i="1" smtClean="0">
                             <a:latin typeface="Cambria Math" panose="02040503050406030204" pitchFamily="18" charset="0"/>
                             <a:ea typeface="Cambria Math" panose="02040503050406030204" pitchFamily="18" charset="0"/>
                           </a:rPr>
@@ -3531,14 +3534,14 @@
                   </m:oMath>
                 </a14:m>
                 <a:r>
-                  <a:rPr lang="en-US" sz="1600" b="1" dirty="0"/>
+                  <a:rPr lang="en-US" sz="1800" b="1" dirty="0"/>
                   <a:t> </a:t>
                 </a:r>
               </a:p>
               <a:p>
                 <a:pPr lvl="1"/>
                 <a:r>
-                  <a:rPr lang="en-US" sz="1600" dirty="0"/>
+                  <a:rPr lang="en-US" sz="1800" dirty="0"/>
                   <a:t>Public Randomization Matrix </a:t>
                 </a:r>
                 <a14:m>
@@ -3546,14 +3549,14 @@
                     <m:sSub>
                       <m:sSubPr>
                         <m:ctrlPr>
-                          <a:rPr lang="en-US" sz="1600" b="1" i="1" smtClean="0">
+                          <a:rPr lang="en-US" sz="1800" b="1" i="1" smtClean="0">
                             <a:latin typeface="Cambria Math" panose="02040503050406030204" pitchFamily="18" charset="0"/>
                           </a:rPr>
                         </m:ctrlPr>
                       </m:sSubPr>
                       <m:e>
                         <m:r>
-                          <a:rPr lang="en-US" sz="1600" b="1" i="1" smtClean="0">
+                          <a:rPr lang="en-US" sz="1800" b="1" i="1" smtClean="0">
                             <a:latin typeface="Cambria Math" panose="02040503050406030204" pitchFamily="18" charset="0"/>
                           </a:rPr>
                           <m:t>𝑹</m:t>
@@ -3561,7 +3564,7 @@
                       </m:e>
                       <m:sub>
                         <m:r>
-                          <a:rPr lang="en-US" sz="1600" b="1" i="1" smtClean="0">
+                          <a:rPr lang="en-US" sz="1800" b="1" i="1" smtClean="0">
                             <a:latin typeface="Cambria Math" panose="02040503050406030204" pitchFamily="18" charset="0"/>
                           </a:rPr>
                           <m:t>𝒎𝒂𝒕</m:t>
@@ -3569,13 +3572,13 @@
                       </m:sub>
                     </m:sSub>
                     <m:r>
-                      <a:rPr lang="en-US" sz="1600" b="1" i="1" smtClean="0">
+                      <a:rPr lang="en-US" sz="1800" b="1" i="1" smtClean="0">
                         <a:latin typeface="Cambria Math" panose="02040503050406030204" pitchFamily="18" charset="0"/>
                       </a:rPr>
                       <m:t> </m:t>
                     </m:r>
                     <m:r>
-                      <a:rPr lang="en-US" sz="1600" b="1" i="1" smtClean="0">
+                      <a:rPr lang="en-US" sz="1800" b="1" i="1" smtClean="0">
                         <a:latin typeface="Cambria Math" panose="02040503050406030204" pitchFamily="18" charset="0"/>
                         <a:ea typeface="Cambria Math" panose="02040503050406030204" pitchFamily="18" charset="0"/>
                       </a:rPr>
@@ -3584,7 +3587,7 @@
                     <m:sSubSup>
                       <m:sSubSupPr>
                         <m:ctrlPr>
-                          <a:rPr lang="en-US" sz="1600" b="1" i="1" smtClean="0">
+                          <a:rPr lang="en-US" sz="1800" b="1" i="1" smtClean="0">
                             <a:latin typeface="Cambria Math" panose="02040503050406030204" pitchFamily="18" charset="0"/>
                             <a:ea typeface="Cambria Math" panose="02040503050406030204" pitchFamily="18" charset="0"/>
                           </a:rPr>
@@ -3592,7 +3595,7 @@
                       </m:sSubSupPr>
                       <m:e>
                         <m:r>
-                          <a:rPr lang="en-US" sz="1600" b="1" i="1" smtClean="0">
+                          <a:rPr lang="en-US" sz="1800" b="1" i="1" smtClean="0">
                             <a:latin typeface="Cambria Math" panose="02040503050406030204" pitchFamily="18" charset="0"/>
                             <a:ea typeface="Cambria Math" panose="02040503050406030204" pitchFamily="18" charset="0"/>
                           </a:rPr>
@@ -3601,7 +3604,7 @@
                       </m:e>
                       <m:sub>
                         <m:r>
-                          <a:rPr lang="en-US" sz="1600" b="1" i="1" smtClean="0">
+                          <a:rPr lang="en-US" sz="1800" b="1" i="1" smtClean="0">
                             <a:latin typeface="Cambria Math" panose="02040503050406030204" pitchFamily="18" charset="0"/>
                             <a:ea typeface="Cambria Math" panose="02040503050406030204" pitchFamily="18" charset="0"/>
                           </a:rPr>
@@ -3610,21 +3613,21 @@
                       </m:sub>
                       <m:sup>
                         <m:r>
-                          <a:rPr lang="en-US" sz="1600" b="1" i="1" smtClean="0">
+                          <a:rPr lang="en-US" sz="1800" b="1" i="1" smtClean="0">
                             <a:latin typeface="Cambria Math" panose="02040503050406030204" pitchFamily="18" charset="0"/>
                             <a:ea typeface="Cambria Math" panose="02040503050406030204" pitchFamily="18" charset="0"/>
                           </a:rPr>
                           <m:t>𝒕</m:t>
                         </m:r>
                         <m:r>
-                          <a:rPr lang="en-US" sz="1600" b="1" i="1" smtClean="0">
+                          <a:rPr lang="en-US" sz="1800" b="1" i="1" smtClean="0">
                             <a:latin typeface="Cambria Math" panose="02040503050406030204" pitchFamily="18" charset="0"/>
                             <a:ea typeface="Cambria Math" panose="02040503050406030204" pitchFamily="18" charset="0"/>
                           </a:rPr>
                           <m:t> × </m:t>
                         </m:r>
                         <m:r>
-                          <a:rPr lang="en-US" sz="1600" b="1" i="1" smtClean="0">
+                          <a:rPr lang="en-US" sz="1800" b="1" i="1" smtClean="0">
                             <a:latin typeface="Cambria Math" panose="02040503050406030204" pitchFamily="18" charset="0"/>
                             <a:ea typeface="Cambria Math" panose="02040503050406030204" pitchFamily="18" charset="0"/>
                           </a:rPr>
@@ -3634,15 +3637,15 @@
                     </m:sSubSup>
                   </m:oMath>
                 </a14:m>
-                <a:endParaRPr lang="en-US" sz="1600" b="1" dirty="0"/>
+                <a:endParaRPr lang="en-US" sz="1800" b="1" dirty="0"/>
               </a:p>
               <a:p>
                 <a:r>
-                  <a:rPr lang="en-US" sz="2000" b="1" dirty="0"/>
+                  <a:rPr lang="en-US" sz="2400" b="1" dirty="0"/>
                   <a:t>Output:</a:t>
                 </a:r>
                 <a:r>
-                  <a:rPr lang="en-US" sz="1600" b="1" dirty="0"/>
+                  <a:rPr lang="en-US" sz="1800" b="1" dirty="0"/>
                   <a:t> </a:t>
                 </a:r>
                 <a14:m>
@@ -3650,7 +3653,7 @@
                     <m:d>
                       <m:dPr>
                         <m:ctrlPr>
-                          <a:rPr lang="en-US" sz="1600" b="1" i="1" smtClean="0">
+                          <a:rPr lang="en-US" sz="1800" b="1" i="1" smtClean="0">
                             <a:latin typeface="Cambria Math" panose="02040503050406030204" pitchFamily="18" charset="0"/>
                           </a:rPr>
                         </m:ctrlPr>
@@ -3659,7 +3662,7 @@
                         <m:d>
                           <m:dPr>
                             <m:ctrlPr>
-                              <a:rPr lang="en-US" sz="1600" b="1" i="1" smtClean="0">
+                              <a:rPr lang="en-US" sz="1800" b="1" i="1" smtClean="0">
                                 <a:latin typeface="Cambria Math" panose="02040503050406030204" pitchFamily="18" charset="0"/>
                               </a:rPr>
                             </m:ctrlPr>
@@ -3668,32 +3671,32 @@
                             <m:d>
                               <m:dPr>
                                 <m:ctrlPr>
-                                  <a:rPr lang="en-US" sz="1600" b="1" i="1" smtClean="0">
+                                  <a:rPr lang="en-US" sz="1800" b="1" i="1" smtClean="0">
                                     <a:latin typeface="Cambria Math" panose="02040503050406030204" pitchFamily="18" charset="0"/>
                                   </a:rPr>
                                 </m:ctrlPr>
                               </m:dPr>
                               <m:e>
                                 <m:r>
-                                  <a:rPr lang="en-US" sz="1600" b="1" i="1" smtClean="0">
+                                  <a:rPr lang="en-US" sz="1800" b="1" i="1" smtClean="0">
                                     <a:latin typeface="Cambria Math" panose="02040503050406030204" pitchFamily="18" charset="0"/>
                                   </a:rPr>
                                   <m:t>𝑲</m:t>
                                 </m:r>
                                 <m:r>
-                                  <a:rPr lang="en-US" sz="1600" b="1" i="1" smtClean="0">
+                                  <a:rPr lang="en-US" sz="1800" b="1" i="1" smtClean="0">
                                     <a:latin typeface="Cambria Math" panose="02040503050406030204" pitchFamily="18" charset="0"/>
                                   </a:rPr>
                                   <m:t>⋅</m:t>
                                 </m:r>
                                 <m:r>
-                                  <a:rPr lang="en-US" sz="1600" b="1" i="1" smtClean="0">
+                                  <a:rPr lang="en-US" sz="1800" b="1" i="1" smtClean="0">
                                     <a:latin typeface="Cambria Math" panose="02040503050406030204" pitchFamily="18" charset="0"/>
                                   </a:rPr>
                                   <m:t> </m:t>
                                 </m:r>
                                 <m:r>
-                                  <a:rPr lang="en-US" sz="1600" b="1" i="1" smtClean="0">
+                                  <a:rPr lang="en-US" sz="1800" b="1" i="1" smtClean="0">
                                     <a:latin typeface="Cambria Math" panose="02040503050406030204" pitchFamily="18" charset="0"/>
                                   </a:rPr>
                                   <m:t>𝒙</m:t>
@@ -3701,25 +3704,25 @@
                               </m:e>
                             </m:d>
                             <m:r>
-                              <a:rPr lang="en-US" sz="1600" b="1" i="1" smtClean="0">
+                              <a:rPr lang="en-US" sz="1800" b="1" i="1" smtClean="0">
                                 <a:latin typeface="Cambria Math" panose="02040503050406030204" pitchFamily="18" charset="0"/>
                               </a:rPr>
                               <m:t> </m:t>
                             </m:r>
                             <m:r>
-                              <a:rPr lang="en-US" sz="1600" b="1" i="1" smtClean="0">
+                              <a:rPr lang="en-US" sz="1800" b="1" i="1" smtClean="0">
                                 <a:latin typeface="Cambria Math" panose="02040503050406030204" pitchFamily="18" charset="0"/>
                               </a:rPr>
                               <m:t>𝒎𝒐𝒅</m:t>
                             </m:r>
                             <m:r>
-                              <a:rPr lang="en-US" sz="1600" b="1" i="1" smtClean="0">
+                              <a:rPr lang="en-US" sz="1800" b="1" i="1" smtClean="0">
                                 <a:latin typeface="Cambria Math" panose="02040503050406030204" pitchFamily="18" charset="0"/>
                               </a:rPr>
                               <m:t> </m:t>
                             </m:r>
                             <m:r>
-                              <a:rPr lang="en-US" sz="1600" b="1" i="1" smtClean="0">
+                              <a:rPr lang="en-US" sz="1800" b="1" i="1" smtClean="0">
                                 <a:latin typeface="Cambria Math" panose="02040503050406030204" pitchFamily="18" charset="0"/>
                               </a:rPr>
                               <m:t>𝟐</m:t>
@@ -3727,13 +3730,13 @@
                           </m:e>
                         </m:d>
                         <m:r>
-                          <a:rPr lang="en-US" sz="1600" b="1" i="1" smtClean="0">
+                          <a:rPr lang="en-US" sz="1800" b="1" i="1" smtClean="0">
                             <a:latin typeface="Cambria Math" panose="02040503050406030204" pitchFamily="18" charset="0"/>
                           </a:rPr>
                           <m:t>⋅</m:t>
                         </m:r>
                         <m:r>
-                          <a:rPr lang="en-US" sz="1600" b="1" i="1" smtClean="0">
+                          <a:rPr lang="en-US" sz="1800" b="1" i="1" smtClean="0">
                             <a:latin typeface="Cambria Math" panose="02040503050406030204" pitchFamily="18" charset="0"/>
                             <a:ea typeface="Cambria Math" panose="02040503050406030204" pitchFamily="18" charset="0"/>
                           </a:rPr>
@@ -3742,7 +3745,7 @@
                         <m:sSub>
                           <m:sSubPr>
                             <m:ctrlPr>
-                              <a:rPr lang="en-US" sz="1600" b="1" i="1" smtClean="0">
+                              <a:rPr lang="en-US" sz="1800" b="1" i="1" smtClean="0">
                                 <a:latin typeface="Cambria Math" panose="02040503050406030204" pitchFamily="18" charset="0"/>
                                 <a:ea typeface="Cambria Math" panose="02040503050406030204" pitchFamily="18" charset="0"/>
                               </a:rPr>
@@ -3750,7 +3753,7 @@
                           </m:sSubPr>
                           <m:e>
                             <m:r>
-                              <a:rPr lang="en-US" sz="1600" b="1" i="1" smtClean="0">
+                              <a:rPr lang="en-US" sz="1800" b="1" i="1" smtClean="0">
                                 <a:latin typeface="Cambria Math" panose="02040503050406030204" pitchFamily="18" charset="0"/>
                                 <a:ea typeface="Cambria Math" panose="02040503050406030204" pitchFamily="18" charset="0"/>
                               </a:rPr>
@@ -3759,7 +3762,7 @@
                           </m:e>
                           <m:sub>
                             <m:r>
-                              <a:rPr lang="en-US" sz="1600" b="1" i="1" smtClean="0">
+                              <a:rPr lang="en-US" sz="1800" b="1" i="1" smtClean="0">
                                 <a:latin typeface="Cambria Math" panose="02040503050406030204" pitchFamily="18" charset="0"/>
                                 <a:ea typeface="Cambria Math" panose="02040503050406030204" pitchFamily="18" charset="0"/>
                               </a:rPr>
@@ -3770,7 +3773,7 @@
                       </m:e>
                     </m:d>
                     <m:r>
-                      <a:rPr lang="en-US" sz="1600" b="1" i="1" smtClean="0">
+                      <a:rPr lang="en-US" sz="1800" b="1" i="1" smtClean="0">
                         <a:latin typeface="Cambria Math" panose="02040503050406030204" pitchFamily="18" charset="0"/>
                         <a:ea typeface="Cambria Math" panose="02040503050406030204" pitchFamily="18" charset="0"/>
                       </a:rPr>
@@ -3779,7 +3782,7 @@
                     <m:sSubSup>
                       <m:sSubSupPr>
                         <m:ctrlPr>
-                          <a:rPr lang="en-US" sz="1600" b="1" i="1" smtClean="0">
+                          <a:rPr lang="en-US" sz="1800" b="1" i="1" smtClean="0">
                             <a:latin typeface="Cambria Math" panose="02040503050406030204" pitchFamily="18" charset="0"/>
                             <a:ea typeface="Cambria Math" panose="02040503050406030204" pitchFamily="18" charset="0"/>
                           </a:rPr>
@@ -3787,7 +3790,7 @@
                       </m:sSubSupPr>
                       <m:e>
                         <m:r>
-                          <a:rPr lang="en-US" sz="1600" b="1" i="1" smtClean="0">
+                          <a:rPr lang="en-US" sz="1800" b="1" i="1" smtClean="0">
                             <a:latin typeface="Cambria Math" panose="02040503050406030204" pitchFamily="18" charset="0"/>
                             <a:ea typeface="Cambria Math" panose="02040503050406030204" pitchFamily="18" charset="0"/>
                           </a:rPr>
@@ -3796,7 +3799,7 @@
                       </m:e>
                       <m:sub>
                         <m:r>
-                          <a:rPr lang="en-US" sz="1600" b="1" i="1" smtClean="0">
+                          <a:rPr lang="en-US" sz="1800" b="1" i="1" smtClean="0">
                             <a:latin typeface="Cambria Math" panose="02040503050406030204" pitchFamily="18" charset="0"/>
                             <a:ea typeface="Cambria Math" panose="02040503050406030204" pitchFamily="18" charset="0"/>
                           </a:rPr>
@@ -3805,7 +3808,7 @@
                       </m:sub>
                       <m:sup>
                         <m:r>
-                          <a:rPr lang="en-US" sz="1600" b="1" i="1" smtClean="0">
+                          <a:rPr lang="en-US" sz="1800" b="1" i="1" smtClean="0">
                             <a:latin typeface="Cambria Math" panose="02040503050406030204" pitchFamily="18" charset="0"/>
                             <a:ea typeface="Cambria Math" panose="02040503050406030204" pitchFamily="18" charset="0"/>
                           </a:rPr>
@@ -3815,39 +3818,39 @@
                     </m:sSubSup>
                   </m:oMath>
                 </a14:m>
-                <a:endParaRPr lang="en-US" sz="1600" b="1" dirty="0"/>
+                <a:endParaRPr lang="en-US" sz="1800" b="1" dirty="0"/>
               </a:p>
               <a:p>
                 <a:r>
-                  <a:rPr lang="en-US" sz="2000" b="1" dirty="0"/>
+                  <a:rPr lang="en-US" sz="2400" b="1" dirty="0"/>
                   <a:t>Phase 1: </a:t>
                 </a:r>
                 <a:r>
-                  <a:rPr lang="en-US" sz="2000" dirty="0"/>
+                  <a:rPr lang="en-US" sz="2400" dirty="0"/>
                   <a:t>Parties compute the product </a:t>
                 </a:r>
                 <a14:m>
                   <m:oMath xmlns:m="http://schemas.openxmlformats.org/officeDocument/2006/math">
                     <m:r>
-                      <a:rPr lang="en-US" sz="2000" b="1" i="1" smtClean="0">
+                      <a:rPr lang="en-US" sz="2400" b="1" i="1" smtClean="0">
                         <a:latin typeface="Cambria Math" panose="02040503050406030204" pitchFamily="18" charset="0"/>
                       </a:rPr>
                       <m:t>𝑲</m:t>
                     </m:r>
                     <m:r>
-                      <a:rPr lang="en-US" sz="2000" b="1" i="1" smtClean="0">
+                      <a:rPr lang="en-US" sz="2400" b="1" i="1" smtClean="0">
                         <a:latin typeface="Cambria Math" panose="02040503050406030204" pitchFamily="18" charset="0"/>
                       </a:rPr>
                       <m:t>⋅</m:t>
                     </m:r>
                     <m:r>
-                      <a:rPr lang="en-US" sz="2000" b="1" i="1" smtClean="0">
+                      <a:rPr lang="en-US" sz="2400" b="1" i="1" smtClean="0">
                         <a:latin typeface="Cambria Math" panose="02040503050406030204" pitchFamily="18" charset="0"/>
                       </a:rPr>
                       <m:t> </m:t>
                     </m:r>
                     <m:r>
-                      <a:rPr lang="en-US" sz="2000" b="1" i="1" smtClean="0">
+                      <a:rPr lang="en-US" sz="2400" b="1" i="1" smtClean="0">
                         <a:latin typeface="Cambria Math" panose="02040503050406030204" pitchFamily="18" charset="0"/>
                         <a:ea typeface="Cambria Math" panose="02040503050406030204" pitchFamily="18" charset="0"/>
                       </a:rPr>
@@ -3856,14 +3859,14 @@
                   </m:oMath>
                 </a14:m>
                 <a:r>
-                  <a:rPr lang="en-US" sz="2000" b="1" dirty="0"/>
+                  <a:rPr lang="en-US" sz="2400" b="1" dirty="0"/>
                   <a:t> </a:t>
                 </a:r>
               </a:p>
               <a:p>
                 <a:pPr lvl="1"/>
                 <a:r>
-                  <a:rPr lang="en-US" sz="1600" dirty="0"/>
+                  <a:rPr lang="en-US" sz="1800" dirty="0"/>
                   <a:t>Parties mask their inputs and key in order to compute the term </a:t>
                 </a:r>
                 <a14:m>
@@ -3871,14 +3874,14 @@
                     <m:sSub>
                       <m:sSubPr>
                         <m:ctrlPr>
-                          <a:rPr lang="en-US" sz="1600" i="1" smtClean="0">
+                          <a:rPr lang="en-US" sz="1800" i="1" smtClean="0">
                             <a:latin typeface="Cambria Math" panose="02040503050406030204" pitchFamily="18" charset="0"/>
                           </a:rPr>
                         </m:ctrlPr>
                       </m:sSubPr>
                       <m:e>
                         <m:r>
-                          <a:rPr lang="en-US" sz="1600" b="0" i="1" smtClean="0">
+                          <a:rPr lang="en-US" sz="1800" b="0" i="1" smtClean="0">
                             <a:latin typeface="Cambria Math" panose="02040503050406030204" pitchFamily="18" charset="0"/>
                           </a:rPr>
                           <m:t>𝐾</m:t>
@@ -3886,7 +3889,7 @@
                       </m:e>
                       <m:sub>
                         <m:r>
-                          <a:rPr lang="en-US" sz="1600" b="0" i="1" smtClean="0">
+                          <a:rPr lang="en-US" sz="1800" b="0" i="1" smtClean="0">
                             <a:latin typeface="Cambria Math" panose="02040503050406030204" pitchFamily="18" charset="0"/>
                           </a:rPr>
                           <m:t>1</m:t>
@@ -3896,20 +3899,20 @@
                     <m:sSub>
                       <m:sSubPr>
                         <m:ctrlPr>
-                          <a:rPr lang="en-US" sz="1600" i="1" smtClean="0">
+                          <a:rPr lang="en-US" sz="1800" i="1" smtClean="0">
                             <a:latin typeface="Cambria Math" panose="02040503050406030204" pitchFamily="18" charset="0"/>
                           </a:rPr>
                         </m:ctrlPr>
                       </m:sSubPr>
                       <m:e>
                         <m:r>
-                          <a:rPr lang="en-US" sz="1600" b="0" i="1" smtClean="0">
+                          <a:rPr lang="en-US" sz="1800" b="0" i="1" smtClean="0">
                             <a:latin typeface="Cambria Math" panose="02040503050406030204" pitchFamily="18" charset="0"/>
                           </a:rPr>
                           <m:t>⋅</m:t>
                         </m:r>
                         <m:r>
-                          <a:rPr lang="en-US" sz="1600" b="0" i="1" smtClean="0">
+                          <a:rPr lang="en-US" sz="1800" b="0" i="1" smtClean="0">
                             <a:latin typeface="Cambria Math" panose="02040503050406030204" pitchFamily="18" charset="0"/>
                           </a:rPr>
                           <m:t>𝑥</m:t>
@@ -3917,7 +3920,7 @@
                       </m:e>
                       <m:sub>
                         <m:r>
-                          <a:rPr lang="en-US" sz="1600" b="0" i="1" smtClean="0">
+                          <a:rPr lang="en-US" sz="1800" b="0" i="1" smtClean="0">
                             <a:latin typeface="Cambria Math" panose="02040503050406030204" pitchFamily="18" charset="0"/>
                           </a:rPr>
                           <m:t>2</m:t>
@@ -3925,7 +3928,7 @@
                       </m:sub>
                     </m:sSub>
                     <m:r>
-                      <a:rPr lang="en-US" sz="1600" b="0" i="1" smtClean="0">
+                      <a:rPr lang="en-US" sz="1800" b="0" i="1" smtClean="0">
                         <a:latin typeface="Cambria Math" panose="02040503050406030204" pitchFamily="18" charset="0"/>
                       </a:rPr>
                       <m:t>+ </m:t>
@@ -3933,14 +3936,14 @@
                     <m:sSub>
                       <m:sSubPr>
                         <m:ctrlPr>
-                          <a:rPr lang="en-US" sz="1600" b="0" i="1" smtClean="0">
+                          <a:rPr lang="en-US" sz="1800" b="0" i="1" smtClean="0">
                             <a:latin typeface="Cambria Math" panose="02040503050406030204" pitchFamily="18" charset="0"/>
                           </a:rPr>
                         </m:ctrlPr>
                       </m:sSubPr>
                       <m:e>
                         <m:r>
-                          <a:rPr lang="en-US" sz="1600" b="0" i="1" smtClean="0">
+                          <a:rPr lang="en-US" sz="1800" b="0" i="1" smtClean="0">
                             <a:latin typeface="Cambria Math" panose="02040503050406030204" pitchFamily="18" charset="0"/>
                           </a:rPr>
                           <m:t>𝐾</m:t>
@@ -3948,7 +3951,7 @@
                       </m:e>
                       <m:sub>
                         <m:r>
-                          <a:rPr lang="en-US" sz="1600" b="0" i="1" smtClean="0">
+                          <a:rPr lang="en-US" sz="1800" b="0" i="1" smtClean="0">
                             <a:latin typeface="Cambria Math" panose="02040503050406030204" pitchFamily="18" charset="0"/>
                           </a:rPr>
                           <m:t>2</m:t>
@@ -3956,7 +3959,7 @@
                       </m:sub>
                     </m:sSub>
                     <m:r>
-                      <a:rPr lang="en-US" sz="1600" b="0" i="1" smtClean="0">
+                      <a:rPr lang="en-US" sz="1800" b="0" i="1" smtClean="0">
                         <a:latin typeface="Cambria Math" panose="02040503050406030204" pitchFamily="18" charset="0"/>
                       </a:rPr>
                       <m:t>⋅</m:t>
@@ -3964,14 +3967,14 @@
                     <m:sSub>
                       <m:sSubPr>
                         <m:ctrlPr>
-                          <a:rPr lang="en-US" sz="1600" b="0" i="1" smtClean="0">
+                          <a:rPr lang="en-US" sz="1800" b="0" i="1" smtClean="0">
                             <a:latin typeface="Cambria Math" panose="02040503050406030204" pitchFamily="18" charset="0"/>
                           </a:rPr>
                         </m:ctrlPr>
                       </m:sSubPr>
                       <m:e>
                         <m:r>
-                          <a:rPr lang="en-US" sz="1600" b="0" i="1" smtClean="0">
+                          <a:rPr lang="en-US" sz="1800" b="0" i="1" smtClean="0">
                             <a:latin typeface="Cambria Math" panose="02040503050406030204" pitchFamily="18" charset="0"/>
                           </a:rPr>
                           <m:t>𝑥</m:t>
@@ -3979,7 +3982,7 @@
                       </m:e>
                       <m:sub>
                         <m:r>
-                          <a:rPr lang="en-US" sz="1600" b="0" i="1" smtClean="0">
+                          <a:rPr lang="en-US" sz="1800" b="0" i="1" smtClean="0">
                             <a:latin typeface="Cambria Math" panose="02040503050406030204" pitchFamily="18" charset="0"/>
                           </a:rPr>
                           <m:t>1</m:t>
@@ -3988,12 +3991,12 @@
                     </m:sSub>
                   </m:oMath>
                 </a14:m>
-                <a:endParaRPr lang="en-US" sz="1600" b="0" dirty="0"/>
+                <a:endParaRPr lang="en-US" sz="1800" b="0" dirty="0"/>
               </a:p>
               <a:p>
                 <a:pPr lvl="1"/>
                 <a:r>
-                  <a:rPr lang="en-US" sz="1600" dirty="0"/>
+                  <a:rPr lang="en-US" sz="1800" dirty="0"/>
                   <a:t>Parties locally compute their shares of input and key simultaneously, </a:t>
                 </a:r>
                 <a14:m>
@@ -4001,14 +4004,14 @@
                     <m:sSub>
                       <m:sSubPr>
                         <m:ctrlPr>
-                          <a:rPr lang="en-US" sz="1600" i="1" smtClean="0">
+                          <a:rPr lang="en-US" sz="1800" i="1" smtClean="0">
                             <a:latin typeface="Cambria Math" panose="02040503050406030204" pitchFamily="18" charset="0"/>
                           </a:rPr>
                         </m:ctrlPr>
                       </m:sSubPr>
                       <m:e>
                         <m:r>
-                          <a:rPr lang="en-US" sz="1600" b="0" i="1" smtClean="0">
+                          <a:rPr lang="en-US" sz="1800" b="0" i="1" smtClean="0">
                             <a:latin typeface="Cambria Math" panose="02040503050406030204" pitchFamily="18" charset="0"/>
                           </a:rPr>
                           <m:t>𝐾</m:t>
@@ -4016,7 +4019,7 @@
                       </m:e>
                       <m:sub>
                         <m:r>
-                          <a:rPr lang="en-US" sz="1600" b="0" i="1" smtClean="0">
+                          <a:rPr lang="en-US" sz="1800" b="0" i="1" smtClean="0">
                             <a:latin typeface="Cambria Math" panose="02040503050406030204" pitchFamily="18" charset="0"/>
                           </a:rPr>
                           <m:t>𝑖</m:t>
@@ -4026,20 +4029,20 @@
                     <m:sSub>
                       <m:sSubPr>
                         <m:ctrlPr>
-                          <a:rPr lang="en-US" sz="1600" i="1" smtClean="0">
+                          <a:rPr lang="en-US" sz="1800" i="1" smtClean="0">
                             <a:latin typeface="Cambria Math" panose="02040503050406030204" pitchFamily="18" charset="0"/>
                           </a:rPr>
                         </m:ctrlPr>
                       </m:sSubPr>
                       <m:e>
                         <m:r>
-                          <a:rPr lang="en-US" sz="1600" b="0" i="1" smtClean="0">
+                          <a:rPr lang="en-US" sz="1800" b="0" i="1" smtClean="0">
                             <a:latin typeface="Cambria Math" panose="02040503050406030204" pitchFamily="18" charset="0"/>
                           </a:rPr>
                           <m:t>⋅</m:t>
                         </m:r>
                         <m:r>
-                          <a:rPr lang="en-US" sz="1600" b="0" i="1" smtClean="0">
+                          <a:rPr lang="en-US" sz="1800" b="0" i="1" smtClean="0">
                             <a:latin typeface="Cambria Math" panose="02040503050406030204" pitchFamily="18" charset="0"/>
                           </a:rPr>
                           <m:t>𝑥</m:t>
@@ -4047,7 +4050,7 @@
                       </m:e>
                       <m:sub>
                         <m:r>
-                          <a:rPr lang="en-US" sz="1600" b="0" i="1" smtClean="0">
+                          <a:rPr lang="en-US" sz="1800" b="0" i="1" smtClean="0">
                             <a:latin typeface="Cambria Math" panose="02040503050406030204" pitchFamily="18" charset="0"/>
                           </a:rPr>
                           <m:t>𝑖</m:t>
@@ -4056,18 +4059,18 @@
                     </m:sSub>
                   </m:oMath>
                 </a14:m>
-                <a:endParaRPr lang="en-US" sz="1600" dirty="0"/>
+                <a:endParaRPr lang="en-US" sz="1800" dirty="0"/>
               </a:p>
               <a:p>
                 <a:r>
-                  <a:rPr lang="en-US" sz="2000" b="1" dirty="0"/>
+                  <a:rPr lang="en-US" sz="2400" b="1" dirty="0"/>
                   <a:t>Phase 2: Share Conversion</a:t>
                 </a:r>
               </a:p>
               <a:p>
                 <a:pPr lvl="1"/>
                 <a:r>
-                  <a:rPr lang="en-US" sz="1600" dirty="0"/>
+                  <a:rPr lang="en-US" sz="1800" dirty="0"/>
                   <a:t>Convert the shares computed by both parties to </a:t>
                 </a:r>
                 <a14:m>
@@ -4075,14 +4078,14 @@
                     <m:sSub>
                       <m:sSubPr>
                         <m:ctrlPr>
-                          <a:rPr lang="en-US" sz="1600" b="1" i="1" smtClean="0">
+                          <a:rPr lang="en-US" sz="1800" b="1" i="1" smtClean="0">
                             <a:latin typeface="Cambria Math" panose="02040503050406030204" pitchFamily="18" charset="0"/>
                           </a:rPr>
                         </m:ctrlPr>
                       </m:sSubPr>
                       <m:e>
                         <m:r>
-                          <a:rPr lang="en-US" sz="1600" b="1" i="1" smtClean="0">
+                          <a:rPr lang="en-US" sz="1800" b="1" i="1" smtClean="0">
                             <a:latin typeface="Cambria Math" panose="02040503050406030204" pitchFamily="18" charset="0"/>
                             <a:ea typeface="Cambria Math" panose="02040503050406030204" pitchFamily="18" charset="0"/>
                           </a:rPr>
@@ -4091,7 +4094,7 @@
                       </m:e>
                       <m:sub>
                         <m:r>
-                          <a:rPr lang="en-US" sz="1600" b="1" i="1" smtClean="0">
+                          <a:rPr lang="en-US" sz="1800" b="1" i="1" smtClean="0">
                             <a:latin typeface="Cambria Math" panose="02040503050406030204" pitchFamily="18" charset="0"/>
                           </a:rPr>
                           <m:t>𝟑</m:t>
@@ -4100,18 +4103,18 @@
                     </m:sSub>
                   </m:oMath>
                 </a14:m>
-                <a:endParaRPr lang="en-US" sz="1600" b="1" dirty="0"/>
+                <a:endParaRPr lang="en-US" sz="1800" b="1" dirty="0"/>
               </a:p>
               <a:p>
                 <a:r>
-                  <a:rPr lang="en-US" sz="2000" b="1" dirty="0"/>
+                  <a:rPr lang="en-US" sz="2400" b="1" dirty="0"/>
                   <a:t>Phase 3: Randomization Matrix</a:t>
                 </a:r>
               </a:p>
               <a:p>
                 <a:pPr lvl="1"/>
                 <a:r>
-                  <a:rPr lang="en-US" sz="1600" dirty="0"/>
+                  <a:rPr lang="en-US" sz="1800" dirty="0"/>
                   <a:t>Multiply the output of both parties in Phase 2 with public randomization matrix </a:t>
                 </a:r>
                 <a14:m>
@@ -4119,14 +4122,14 @@
                     <m:sSub>
                       <m:sSubPr>
                         <m:ctrlPr>
-                          <a:rPr lang="en-US" sz="1600" b="1" i="1" smtClean="0">
+                          <a:rPr lang="en-US" sz="1800" b="1" i="1" smtClean="0">
                             <a:latin typeface="Cambria Math" panose="02040503050406030204" pitchFamily="18" charset="0"/>
                           </a:rPr>
                         </m:ctrlPr>
                       </m:sSubPr>
                       <m:e>
                         <m:r>
-                          <a:rPr lang="en-US" sz="1600" b="1" i="1" smtClean="0">
+                          <a:rPr lang="en-US" sz="1800" b="1" i="1" smtClean="0">
                             <a:latin typeface="Cambria Math" panose="02040503050406030204" pitchFamily="18" charset="0"/>
                           </a:rPr>
                           <m:t>𝑹</m:t>
@@ -4134,7 +4137,7 @@
                       </m:e>
                       <m:sub>
                         <m:r>
-                          <a:rPr lang="en-US" sz="1600" b="1" i="1" smtClean="0">
+                          <a:rPr lang="en-US" sz="1800" b="1" i="1" smtClean="0">
                             <a:latin typeface="Cambria Math" panose="02040503050406030204" pitchFamily="18" charset="0"/>
                           </a:rPr>
                           <m:t>𝒎𝒂𝒕</m:t>
@@ -4144,7 +4147,7 @@
                   </m:oMath>
                 </a14:m>
                 <a:r>
-                  <a:rPr lang="en-US" sz="1600" b="1" dirty="0"/>
+                  <a:rPr lang="en-US" sz="1800" b="1" dirty="0"/>
                   <a:t> </a:t>
                 </a:r>
               </a:p>
@@ -4176,7 +4179,7 @@
               <a:blipFill>
                 <a:blip r:embed="rId2"/>
                 <a:stretch>
-                  <a:fillRect l="-603" t="-1453"/>
+                  <a:fillRect l="-844" t="-1744"/>
                 </a:stretch>
               </a:blipFill>
             </p:spPr>
@@ -6943,6 +6946,86 @@
     <p:extLst>
       <p:ext uri="{BB962C8B-B14F-4D97-AF65-F5344CB8AC3E}">
         <p14:creationId xmlns:p14="http://schemas.microsoft.com/office/powerpoint/2010/main" val="2146455078"/>
+      </p:ext>
+    </p:extLst>
+  </p:cSld>
+  <p:clrMapOvr>
+    <a:masterClrMapping/>
+  </p:clrMapOvr>
+</p:sld>
+</file>
+
+<file path=ppt/slides/slide5.xml><?xml version="1.0" encoding="utf-8"?>
+<p:sld xmlns:a="http://schemas.openxmlformats.org/drawingml/2006/main" xmlns:r="http://schemas.openxmlformats.org/officeDocument/2006/relationships" xmlns:p="http://schemas.openxmlformats.org/presentationml/2006/main">
+  <p:cSld>
+    <p:spTree>
+      <p:nvGrpSpPr>
+        <p:cNvPr id="1" name=""/>
+        <p:cNvGrpSpPr/>
+        <p:nvPr/>
+      </p:nvGrpSpPr>
+      <p:grpSpPr>
+        <a:xfrm>
+          <a:off x="0" y="0"/>
+          <a:ext cx="0" cy="0"/>
+          <a:chOff x="0" y="0"/>
+          <a:chExt cx="0" cy="0"/>
+        </a:xfrm>
+      </p:grpSpPr>
+      <p:sp>
+        <p:nvSpPr>
+          <p:cNvPr id="2" name="Title 1">
+            <a:extLst>
+              <a:ext uri="{FF2B5EF4-FFF2-40B4-BE49-F238E27FC236}">
+                <a16:creationId xmlns:a16="http://schemas.microsoft.com/office/drawing/2014/main" id="{18DBD707-FF77-414A-9130-FF59C80E18C7}"/>
+              </a:ext>
+            </a:extLst>
+          </p:cNvPr>
+          <p:cNvSpPr>
+            <a:spLocks noGrp="1"/>
+          </p:cNvSpPr>
+          <p:nvPr>
+            <p:ph type="title"/>
+          </p:nvPr>
+        </p:nvSpPr>
+        <p:spPr/>
+        <p:txBody>
+          <a:bodyPr/>
+          <a:lstStyle/>
+          <a:p>
+            <a:endParaRPr lang="en-US"/>
+          </a:p>
+        </p:txBody>
+      </p:sp>
+      <p:sp>
+        <p:nvSpPr>
+          <p:cNvPr id="6" name="Content Placeholder 5">
+            <a:extLst>
+              <a:ext uri="{FF2B5EF4-FFF2-40B4-BE49-F238E27FC236}">
+                <a16:creationId xmlns:a16="http://schemas.microsoft.com/office/drawing/2014/main" id="{78C7274D-00FA-A641-A78F-13AF65B7E1B4}"/>
+              </a:ext>
+            </a:extLst>
+          </p:cNvPr>
+          <p:cNvSpPr>
+            <a:spLocks noGrp="1"/>
+          </p:cNvSpPr>
+          <p:nvPr>
+            <p:ph idx="1"/>
+          </p:nvPr>
+        </p:nvSpPr>
+        <p:spPr/>
+        <p:txBody>
+          <a:bodyPr/>
+          <a:lstStyle/>
+          <a:p>
+            <a:endParaRPr lang="en-US" dirty="0"/>
+          </a:p>
+        </p:txBody>
+      </p:sp>
+    </p:spTree>
+    <p:extLst>
+      <p:ext uri="{BB962C8B-B14F-4D97-AF65-F5344CB8AC3E}">
+        <p14:creationId xmlns:p14="http://schemas.microsoft.com/office/powerpoint/2010/main" val="4124445099"/>
       </p:ext>
     </p:extLst>
   </p:cSld>

</xml_diff>